<commit_message>
Updated names on poster
</commit_message>
<xml_diff>
--- a/av3/rocketnet-hub/poster/RocketNetHub_Poster_woodruff.pptx
+++ b/av3/rocketnet-hub/poster/RocketNetHub_Poster_woodruff.pptx
@@ -3059,6 +3059,50 @@
           <a:chExt cx="0" cy="0"/>
         </a:xfrm>
       </p:grpSpPr>
+      <p:sp>
+        <p:nvSpPr>
+          <p:cNvPr id="22" name="TextBox 21"/>
+          <p:cNvSpPr txBox="1"/>
+          <p:nvPr/>
+        </p:nvSpPr>
+        <p:spPr>
+          <a:xfrm flipV="1">
+            <a:off x="-762000" y="-152400"/>
+            <a:ext cx="46405800" cy="4383435"/>
+          </a:xfrm>
+          <a:prstGeom prst="rect">
+            <a:avLst/>
+          </a:prstGeom>
+          <a:solidFill>
+            <a:schemeClr val="accent3">
+              <a:lumMod val="40000"/>
+              <a:lumOff val="60000"/>
+            </a:schemeClr>
+          </a:solidFill>
+        </p:spPr>
+        <p:txBody>
+          <a:bodyPr wrap="square" lIns="73841" tIns="36921" rIns="73841" bIns="36921" rtlCol="0">
+            <a:spAutoFit/>
+          </a:bodyPr>
+          <a:lstStyle/>
+          <a:p>
+            <a:r>
+              <a:rPr lang="en-US" sz="28000" dirty="0" smtClean="0">
+                <a:solidFill>
+                  <a:srgbClr val="6A7F10"/>
+                </a:solidFill>
+              </a:rPr>
+              <a:t>	</a:t>
+            </a:r>
+            <a:endParaRPr lang="en-US" sz="28000" b="1" dirty="0">
+              <a:solidFill>
+                <a:srgbClr val="6A7F10"/>
+              </a:solidFill>
+              <a:latin typeface="Garamond" pitchFamily="18" charset="0"/>
+            </a:endParaRPr>
+          </a:p>
+        </p:txBody>
+      </p:sp>
       <p:pic>
         <p:nvPicPr>
           <p:cNvPr id="8" name="Picture 2" descr="C:\Users\HP-Elitebook\repos\avionics-cad\av3\rocketnet-hub\poster\schematic-combined.png"/>
@@ -3193,7 +3237,7 @@
         </p:nvSpPr>
         <p:spPr>
           <a:xfrm>
-            <a:off x="2057400" y="5629512"/>
+            <a:off x="2057400" y="5257800"/>
             <a:ext cx="13868400" cy="5799207"/>
           </a:xfrm>
           <a:prstGeom prst="rect">
@@ -3224,148 +3268,6 @@
               </a:rPr>
               <a:t>The capstone sponsor, Portland State Aerospace Society (PSAS) designs, builds, and launches high power rockets. Their 2013 Capstone project is a power management and communications solution for use in both their current and next generation launch vehicles.  To accommodate the size and weight restrictions imposed by the physical characteristics of the current launch vehicle, the decision was made to pursue a highly integrated solution which would provide for all the power management functions as well as provide low latency communication between all of the electronic subsystems used in-flight on a single 6-layer PCB with components placed on both sides.</a:t>
             </a:r>
-          </a:p>
-        </p:txBody>
-      </p:sp>
-      <p:sp>
-        <p:nvSpPr>
-          <p:cNvPr id="14" name="TextBox 13"/>
-          <p:cNvSpPr txBox="1"/>
-          <p:nvPr/>
-        </p:nvSpPr>
-        <p:spPr>
-          <a:xfrm>
-            <a:off x="221673" y="571500"/>
-            <a:ext cx="43891200" cy="3053637"/>
-          </a:xfrm>
-          <a:prstGeom prst="rect">
-            <a:avLst/>
-          </a:prstGeom>
-          <a:solidFill>
-            <a:schemeClr val="accent3">
-              <a:lumMod val="40000"/>
-              <a:lumOff val="60000"/>
-            </a:schemeClr>
-          </a:solidFill>
-        </p:spPr>
-        <p:txBody>
-          <a:bodyPr wrap="square" lIns="73841" tIns="36921" rIns="73841" bIns="36921" rtlCol="0">
-            <a:spAutoFit/>
-          </a:bodyPr>
-          <a:lstStyle/>
-          <a:p>
-            <a:r>
-              <a:rPr lang="en-US" sz="19000" dirty="0" smtClean="0">
-                <a:solidFill>
-                  <a:srgbClr val="6A7F10"/>
-                </a:solidFill>
-              </a:rPr>
-              <a:t>	</a:t>
-            </a:r>
-            <a:endParaRPr lang="en-US" sz="19000" b="1" dirty="0">
-              <a:solidFill>
-                <a:srgbClr val="6A7F10"/>
-              </a:solidFill>
-              <a:latin typeface="Garamond" pitchFamily="18" charset="0"/>
-            </a:endParaRPr>
-          </a:p>
-        </p:txBody>
-      </p:sp>
-      <p:sp>
-        <p:nvSpPr>
-          <p:cNvPr id="15" name="Rectangle 14"/>
-          <p:cNvSpPr/>
-          <p:nvPr/>
-        </p:nvSpPr>
-        <p:spPr>
-          <a:xfrm flipH="1">
-            <a:off x="1" y="0"/>
-            <a:ext cx="391885" cy="32918400"/>
-          </a:xfrm>
-          <a:prstGeom prst="rect">
-            <a:avLst/>
-          </a:prstGeom>
-          <a:solidFill>
-            <a:schemeClr val="accent3">
-              <a:lumMod val="75000"/>
-            </a:schemeClr>
-          </a:solidFill>
-          <a:ln>
-            <a:noFill/>
-          </a:ln>
-        </p:spPr>
-        <p:style>
-          <a:lnRef idx="2">
-            <a:schemeClr val="accent1">
-              <a:shade val="50000"/>
-            </a:schemeClr>
-          </a:lnRef>
-          <a:fillRef idx="1">
-            <a:schemeClr val="accent1"/>
-          </a:fillRef>
-          <a:effectRef idx="0">
-            <a:schemeClr val="accent1"/>
-          </a:effectRef>
-          <a:fontRef idx="minor">
-            <a:schemeClr val="lt1"/>
-          </a:fontRef>
-        </p:style>
-        <p:txBody>
-          <a:bodyPr lIns="73841" tIns="36921" rIns="73841" bIns="36921" rtlCol="0" anchor="ctr"/>
-          <a:lstStyle/>
-          <a:p>
-            <a:pPr algn="ctr"/>
-            <a:endParaRPr lang="en-US"/>
-          </a:p>
-        </p:txBody>
-      </p:sp>
-      <p:sp>
-        <p:nvSpPr>
-          <p:cNvPr id="16" name="Rectangle 15"/>
-          <p:cNvSpPr/>
-          <p:nvPr/>
-        </p:nvSpPr>
-        <p:spPr>
-          <a:xfrm flipH="1">
-            <a:off x="391887" y="0"/>
-            <a:ext cx="391885" cy="32918400"/>
-          </a:xfrm>
-          <a:prstGeom prst="rect">
-            <a:avLst/>
-          </a:prstGeom>
-          <a:solidFill>
-            <a:schemeClr val="accent3">
-              <a:lumMod val="20000"/>
-              <a:lumOff val="80000"/>
-              <a:alpha val="80000"/>
-            </a:schemeClr>
-          </a:solidFill>
-          <a:ln>
-            <a:noFill/>
-          </a:ln>
-        </p:spPr>
-        <p:style>
-          <a:lnRef idx="2">
-            <a:schemeClr val="accent1">
-              <a:shade val="50000"/>
-            </a:schemeClr>
-          </a:lnRef>
-          <a:fillRef idx="1">
-            <a:schemeClr val="accent1"/>
-          </a:fillRef>
-          <a:effectRef idx="0">
-            <a:schemeClr val="accent1"/>
-          </a:effectRef>
-          <a:fontRef idx="minor">
-            <a:schemeClr val="lt1"/>
-          </a:fontRef>
-        </p:style>
-        <p:txBody>
-          <a:bodyPr lIns="73841" tIns="36921" rIns="73841" bIns="36921" rtlCol="0" anchor="ctr"/>
-          <a:lstStyle/>
-          <a:p>
-            <a:pPr algn="ctr"/>
-            <a:endParaRPr lang="en-US"/>
           </a:p>
         </p:txBody>
       </p:sp>
@@ -3427,7 +3329,25 @@
                 </a:solidFill>
                 <a:latin typeface="Garamond" pitchFamily="18" charset="0"/>
               </a:rPr>
-              <a:t> Hub || Capstone 2012-2013</a:t>
+              <a:t> Hub </a:t>
+            </a:r>
+            <a:r>
+              <a:rPr lang="en-US" sz="15800" b="1" cap="small" dirty="0" smtClean="0">
+                <a:solidFill>
+                  <a:srgbClr val="6A7F10"/>
+                </a:solidFill>
+                <a:latin typeface="Garamond" pitchFamily="18" charset="0"/>
+              </a:rPr>
+              <a:t>| </a:t>
+            </a:r>
+            <a:r>
+              <a:rPr lang="en-US" sz="15800" b="1" cap="small" dirty="0" smtClean="0">
+                <a:solidFill>
+                  <a:srgbClr val="6A7F10"/>
+                </a:solidFill>
+                <a:latin typeface="Garamond" pitchFamily="18" charset="0"/>
+              </a:rPr>
+              <a:t>Capstone 2012-2013</a:t>
             </a:r>
             <a:endParaRPr lang="en-US" sz="15800" b="1" cap="small" dirty="0">
               <a:solidFill>
@@ -3446,7 +3366,7 @@
         </p:nvSpPr>
         <p:spPr>
           <a:xfrm>
-            <a:off x="2057400" y="12367438"/>
+            <a:off x="2057400" y="11277600"/>
             <a:ext cx="13868400" cy="5355312"/>
           </a:xfrm>
           <a:prstGeom prst="rect">
@@ -3552,7 +3472,7 @@
         </p:nvSpPr>
         <p:spPr>
           <a:xfrm>
-            <a:off x="18023156" y="5629512"/>
+            <a:off x="18023156" y="5257800"/>
             <a:ext cx="23414048" cy="11356955"/>
           </a:xfrm>
           <a:prstGeom prst="rect">
@@ -3719,93 +3639,13 @@
       </p:sp>
       <p:sp>
         <p:nvSpPr>
-          <p:cNvPr id="2" name="TextBox 1"/>
-          <p:cNvSpPr txBox="1"/>
-          <p:nvPr/>
-        </p:nvSpPr>
-        <p:spPr>
-          <a:xfrm>
-            <a:off x="29012662" y="19699069"/>
-            <a:ext cx="10357579" cy="646331"/>
-          </a:xfrm>
-          <a:prstGeom prst="rect">
-            <a:avLst/>
-          </a:prstGeom>
-          <a:noFill/>
-        </p:spPr>
-        <p:txBody>
-          <a:bodyPr wrap="none" rtlCol="0">
-            <a:spAutoFit/>
-          </a:bodyPr>
-          <a:lstStyle/>
-          <a:p>
-            <a:r>
-              <a:rPr lang="en-US" sz="3600" b="1" dirty="0" err="1" smtClean="0"/>
-              <a:t>RocketNet</a:t>
-            </a:r>
-            <a:r>
-              <a:rPr lang="en-US" sz="3600" b="1" dirty="0" smtClean="0"/>
-              <a:t> </a:t>
-            </a:r>
-            <a:r>
-              <a:rPr lang="en-US" sz="3600" b="1" dirty="0"/>
-              <a:t>P</a:t>
-            </a:r>
-            <a:r>
-              <a:rPr lang="en-US" sz="3600" b="1" dirty="0" smtClean="0"/>
-              <a:t>ower and Data Distribution Board Layout</a:t>
-            </a:r>
-            <a:endParaRPr lang="en-US" sz="3600" b="1" dirty="0"/>
-          </a:p>
-        </p:txBody>
-      </p:sp>
-      <p:sp>
-        <p:nvSpPr>
-          <p:cNvPr id="6" name="TextBox 5"/>
-          <p:cNvSpPr txBox="1"/>
-          <p:nvPr/>
-        </p:nvSpPr>
-        <p:spPr>
-          <a:xfrm>
-            <a:off x="27813000" y="32035053"/>
-            <a:ext cx="14695370" cy="584775"/>
-          </a:xfrm>
-          <a:prstGeom prst="rect">
-            <a:avLst/>
-          </a:prstGeom>
-          <a:noFill/>
-        </p:spPr>
-        <p:txBody>
-          <a:bodyPr wrap="none" rtlCol="0">
-            <a:spAutoFit/>
-          </a:bodyPr>
-          <a:lstStyle/>
-          <a:p>
-            <a:r>
-              <a:rPr lang="en-US" sz="3200" baseline="30000" dirty="0" smtClean="0"/>
-              <a:t>†</a:t>
-            </a:r>
-            <a:r>
-              <a:rPr lang="en-US" sz="3200" dirty="0" smtClean="0"/>
-              <a:t>Background image is a screenshot of the STM32 microcontroller schematic in </a:t>
-            </a:r>
-            <a:r>
-              <a:rPr lang="en-US" sz="3200" dirty="0" err="1" smtClean="0"/>
-              <a:t>Eaglecad</a:t>
-            </a:r>
-            <a:endParaRPr lang="en-US" sz="3200" dirty="0"/>
-          </a:p>
-        </p:txBody>
-      </p:sp>
-      <p:sp>
-        <p:nvSpPr>
           <p:cNvPr id="20" name="TextBox 19"/>
           <p:cNvSpPr txBox="1"/>
           <p:nvPr/>
         </p:nvSpPr>
         <p:spPr>
           <a:xfrm>
-            <a:off x="6096000" y="19927669"/>
+            <a:off x="7742251" y="17565469"/>
             <a:ext cx="5037918" cy="646331"/>
           </a:xfrm>
           <a:prstGeom prst="rect">
@@ -3824,44 +3664,6 @@
               <a:t>High-Level Block Diagram</a:t>
             </a:r>
             <a:endParaRPr lang="en-US" sz="3600" b="1" dirty="0"/>
-          </a:p>
-        </p:txBody>
-      </p:sp>
-      <p:sp>
-        <p:nvSpPr>
-          <p:cNvPr id="7" name="TextBox 6"/>
-          <p:cNvSpPr txBox="1"/>
-          <p:nvPr/>
-        </p:nvSpPr>
-        <p:spPr>
-          <a:xfrm>
-            <a:off x="2678230" y="3790544"/>
-            <a:ext cx="39688970" cy="923330"/>
-          </a:xfrm>
-          <a:prstGeom prst="rect">
-            <a:avLst/>
-          </a:prstGeom>
-          <a:noFill/>
-        </p:spPr>
-        <p:txBody>
-          <a:bodyPr wrap="square" rtlCol="0">
-            <a:spAutoFit/>
-          </a:bodyPr>
-          <a:lstStyle/>
-          <a:p>
-            <a:r>
-              <a:rPr lang="en-US" sz="5400" dirty="0" smtClean="0"/>
-              <a:t>Sponsor---Andrew Greenberg | Members--Jackson Pugh---Michael Woodruff---JJ Hartley | </a:t>
-            </a:r>
-            <a:r>
-              <a:rPr lang="en-US" sz="5400" smtClean="0"/>
-              <a:t>Faculty Advisor---Dr</a:t>
-            </a:r>
-            <a:r>
-              <a:rPr lang="en-US" sz="5400" dirty="0" smtClean="0"/>
-              <a:t>. Richard Campbell</a:t>
-            </a:r>
-            <a:endParaRPr lang="en-US" sz="5400" dirty="0"/>
           </a:p>
         </p:txBody>
       </p:sp>
@@ -3887,7 +3689,7 @@
         </p:blipFill>
         <p:spPr bwMode="auto">
           <a:xfrm>
-            <a:off x="2286000" y="18184415"/>
+            <a:off x="2057400" y="18211800"/>
             <a:ext cx="16407620" cy="11331684"/>
           </a:xfrm>
           <a:prstGeom prst="rect">
@@ -3927,7 +3729,7 @@
         </p:blipFill>
         <p:spPr bwMode="auto">
           <a:xfrm>
-            <a:off x="20167199" y="17370927"/>
+            <a:off x="22522715" y="17370927"/>
             <a:ext cx="17932801" cy="12270873"/>
           </a:xfrm>
           <a:prstGeom prst="rect">
@@ -3948,6 +3750,280 @@
           </a:extLst>
         </p:spPr>
       </p:pic>
+      <p:graphicFrame>
+        <p:nvGraphicFramePr>
+          <p:cNvPr id="11" name="Table 10"/>
+          <p:cNvGraphicFramePr>
+            <a:graphicFrameLocks noGrp="1"/>
+          </p:cNvGraphicFramePr>
+          <p:nvPr>
+            <p:extLst>
+              <p:ext uri="{D42A27DB-BD31-4B8C-83A1-F6EECF244321}">
+                <p14:modId xmlns:p14="http://schemas.microsoft.com/office/powerpoint/2010/main" val="3246525833"/>
+              </p:ext>
+            </p:extLst>
+          </p:nvPr>
+        </p:nvGraphicFramePr>
+        <p:xfrm>
+          <a:off x="-152399" y="3429000"/>
+          <a:ext cx="44653199" cy="1554480"/>
+        </p:xfrm>
+        <a:graphic>
+          <a:graphicData uri="http://schemas.openxmlformats.org/drawingml/2006/table">
+            <a:tbl>
+              <a:tblPr firstRow="1" bandRow="1">
+                <a:tableStyleId>{5C22544A-7EE6-4342-B048-85BDC9FD1C3A}</a:tableStyleId>
+              </a:tblPr>
+              <a:tblGrid>
+                <a:gridCol w="13632758"/>
+                <a:gridCol w="16136041"/>
+                <a:gridCol w="14884400"/>
+              </a:tblGrid>
+              <a:tr h="1327863">
+                <a:tc>
+                  <a:txBody>
+                    <a:bodyPr/>
+                    <a:lstStyle/>
+                    <a:p>
+                      <a:pPr marL="0" marR="0" indent="0" algn="ctr" defTabSz="4388211" rtl="0" eaLnBrk="1" fontAlgn="auto" latinLnBrk="0" hangingPunct="1">
+                        <a:lnSpc>
+                          <a:spcPct val="100000"/>
+                        </a:lnSpc>
+                        <a:spcBef>
+                          <a:spcPts val="0"/>
+                        </a:spcBef>
+                        <a:spcAft>
+                          <a:spcPts val="0"/>
+                        </a:spcAft>
+                        <a:buClrTx/>
+                        <a:buSzTx/>
+                        <a:buFontTx/>
+                        <a:buNone/>
+                        <a:tabLst/>
+                        <a:defRPr/>
+                      </a:pPr>
+                      <a:r>
+                        <a:rPr lang="en-US" sz="4800" dirty="0" smtClean="0">
+                          <a:solidFill>
+                            <a:sysClr val="windowText" lastClr="000000"/>
+                          </a:solidFill>
+                        </a:rPr>
+                        <a:t>Industry Member: Andrew Greenberg</a:t>
+                      </a:r>
+                      <a:endParaRPr lang="en-US" sz="4800" dirty="0">
+                        <a:solidFill>
+                          <a:sysClr val="windowText" lastClr="000000"/>
+                        </a:solidFill>
+                      </a:endParaRPr>
+                    </a:p>
+                  </a:txBody>
+                  <a:tcPr>
+                    <a:noFill/>
+                  </a:tcPr>
+                </a:tc>
+                <a:tc>
+                  <a:txBody>
+                    <a:bodyPr/>
+                    <a:lstStyle/>
+                    <a:p>
+                      <a:pPr algn="ctr"/>
+                      <a:r>
+                        <a:rPr lang="en-US" sz="4800" dirty="0" smtClean="0">
+                          <a:solidFill>
+                            <a:sysClr val="windowText" lastClr="000000"/>
+                          </a:solidFill>
+                        </a:rPr>
+                        <a:t>Members:</a:t>
+                      </a:r>
+                      <a:r>
+                        <a:rPr lang="en-US" sz="4800" baseline="0" dirty="0" smtClean="0">
+                          <a:solidFill>
+                            <a:sysClr val="windowText" lastClr="000000"/>
+                          </a:solidFill>
+                        </a:rPr>
+                        <a:t> </a:t>
+                      </a:r>
+                      <a:r>
+                        <a:rPr lang="en-US" sz="4800" dirty="0" smtClean="0">
+                          <a:solidFill>
+                            <a:sysClr val="windowText" lastClr="000000"/>
+                          </a:solidFill>
+                        </a:rPr>
+                        <a:t>Jackson Pugh-Michael Woodruff-JJ Hartley </a:t>
+                      </a:r>
+                      <a:endParaRPr lang="en-US" sz="4800" dirty="0">
+                        <a:solidFill>
+                          <a:sysClr val="windowText" lastClr="000000"/>
+                        </a:solidFill>
+                      </a:endParaRPr>
+                    </a:p>
+                  </a:txBody>
+                  <a:tcPr>
+                    <a:noFill/>
+                  </a:tcPr>
+                </a:tc>
+                <a:tc>
+                  <a:txBody>
+                    <a:bodyPr/>
+                    <a:lstStyle/>
+                    <a:p>
+                      <a:pPr marL="0" marR="0" indent="0" algn="ctr" defTabSz="4388211" rtl="0" eaLnBrk="1" fontAlgn="auto" latinLnBrk="0" hangingPunct="1">
+                        <a:lnSpc>
+                          <a:spcPct val="100000"/>
+                        </a:lnSpc>
+                        <a:spcBef>
+                          <a:spcPts val="0"/>
+                        </a:spcBef>
+                        <a:spcAft>
+                          <a:spcPts val="0"/>
+                        </a:spcAft>
+                        <a:buClrTx/>
+                        <a:buSzTx/>
+                        <a:buFontTx/>
+                        <a:buNone/>
+                        <a:tabLst/>
+                        <a:defRPr/>
+                      </a:pPr>
+                      <a:r>
+                        <a:rPr lang="en-US" sz="4800" dirty="0" smtClean="0">
+                          <a:solidFill>
+                            <a:sysClr val="windowText" lastClr="000000"/>
+                          </a:solidFill>
+                        </a:rPr>
+                        <a:t>Faculty Advisor:</a:t>
+                      </a:r>
+                      <a:r>
+                        <a:rPr lang="en-US" sz="4800" baseline="0" dirty="0" smtClean="0">
+                          <a:solidFill>
+                            <a:sysClr val="windowText" lastClr="000000"/>
+                          </a:solidFill>
+                        </a:rPr>
+                        <a:t> </a:t>
+                      </a:r>
+                      <a:r>
+                        <a:rPr lang="en-US" sz="4800" dirty="0" smtClean="0">
+                          <a:solidFill>
+                            <a:sysClr val="windowText" lastClr="000000"/>
+                          </a:solidFill>
+                        </a:rPr>
+                        <a:t>Dr. Richard Campbell</a:t>
+                      </a:r>
+                    </a:p>
+                    <a:p>
+                      <a:endParaRPr lang="en-US" sz="4800" dirty="0">
+                        <a:solidFill>
+                          <a:sysClr val="windowText" lastClr="000000"/>
+                        </a:solidFill>
+                      </a:endParaRPr>
+                    </a:p>
+                  </a:txBody>
+                  <a:tcPr>
+                    <a:noFill/>
+                  </a:tcPr>
+                </a:tc>
+              </a:tr>
+            </a:tbl>
+          </a:graphicData>
+        </a:graphic>
+      </p:graphicFrame>
+      <p:sp>
+        <p:nvSpPr>
+          <p:cNvPr id="15" name="Rectangle 14"/>
+          <p:cNvSpPr/>
+          <p:nvPr/>
+        </p:nvSpPr>
+        <p:spPr>
+          <a:xfrm flipH="1">
+            <a:off x="1" y="0"/>
+            <a:ext cx="391885" cy="32918400"/>
+          </a:xfrm>
+          <a:prstGeom prst="rect">
+            <a:avLst/>
+          </a:prstGeom>
+          <a:solidFill>
+            <a:schemeClr val="accent3">
+              <a:lumMod val="75000"/>
+            </a:schemeClr>
+          </a:solidFill>
+          <a:ln>
+            <a:noFill/>
+          </a:ln>
+        </p:spPr>
+        <p:style>
+          <a:lnRef idx="2">
+            <a:schemeClr val="accent1">
+              <a:shade val="50000"/>
+            </a:schemeClr>
+          </a:lnRef>
+          <a:fillRef idx="1">
+            <a:schemeClr val="accent1"/>
+          </a:fillRef>
+          <a:effectRef idx="0">
+            <a:schemeClr val="accent1"/>
+          </a:effectRef>
+          <a:fontRef idx="minor">
+            <a:schemeClr val="lt1"/>
+          </a:fontRef>
+        </p:style>
+        <p:txBody>
+          <a:bodyPr lIns="73841" tIns="36921" rIns="73841" bIns="36921" rtlCol="0" anchor="ctr"/>
+          <a:lstStyle/>
+          <a:p>
+            <a:pPr algn="ctr"/>
+            <a:endParaRPr lang="en-US"/>
+          </a:p>
+        </p:txBody>
+      </p:sp>
+      <p:sp>
+        <p:nvSpPr>
+          <p:cNvPr id="16" name="Rectangle 15"/>
+          <p:cNvSpPr/>
+          <p:nvPr/>
+        </p:nvSpPr>
+        <p:spPr>
+          <a:xfrm flipH="1">
+            <a:off x="391887" y="0"/>
+            <a:ext cx="391885" cy="32918400"/>
+          </a:xfrm>
+          <a:prstGeom prst="rect">
+            <a:avLst/>
+          </a:prstGeom>
+          <a:solidFill>
+            <a:schemeClr val="accent3">
+              <a:lumMod val="20000"/>
+              <a:lumOff val="80000"/>
+              <a:alpha val="80000"/>
+            </a:schemeClr>
+          </a:solidFill>
+          <a:ln>
+            <a:noFill/>
+          </a:ln>
+        </p:spPr>
+        <p:style>
+          <a:lnRef idx="2">
+            <a:schemeClr val="accent1">
+              <a:shade val="50000"/>
+            </a:schemeClr>
+          </a:lnRef>
+          <a:fillRef idx="1">
+            <a:schemeClr val="accent1"/>
+          </a:fillRef>
+          <a:effectRef idx="0">
+            <a:schemeClr val="accent1"/>
+          </a:effectRef>
+          <a:fontRef idx="minor">
+            <a:schemeClr val="lt1"/>
+          </a:fontRef>
+        </p:style>
+        <p:txBody>
+          <a:bodyPr lIns="73841" tIns="36921" rIns="73841" bIns="36921" rtlCol="0" anchor="ctr"/>
+          <a:lstStyle/>
+          <a:p>
+            <a:pPr algn="ctr"/>
+            <a:endParaRPr lang="en-US"/>
+          </a:p>
+        </p:txBody>
+      </p:sp>
     </p:spTree>
   </p:cSld>
   <p:clrMapOvr>

</xml_diff>

<commit_message>
Rearranged poster, added 3rd Gen. Avionics System image, added text on battery charging subsystem
</commit_message>
<xml_diff>
--- a/av3/rocketnet-hub/poster/RocketNetHub_Poster_woodruff.pptx
+++ b/av3/rocketnet-hub/poster/RocketNetHub_Poster_woodruff.pptx
@@ -3237,8 +3237,8 @@
         </p:nvSpPr>
         <p:spPr>
           <a:xfrm>
-            <a:off x="2057400" y="5257800"/>
-            <a:ext cx="13868400" cy="5799207"/>
+            <a:off x="17171743" y="4876800"/>
+            <a:ext cx="24357257" cy="3952548"/>
           </a:xfrm>
           <a:prstGeom prst="rect">
             <a:avLst/>
@@ -3266,7 +3266,31 @@
               <a:rPr lang="en-US" sz="3000" dirty="0" smtClean="0">
                 <a:latin typeface="Verdana" pitchFamily="34" charset="0"/>
               </a:rPr>
-              <a:t>The capstone sponsor, Portland State Aerospace Society (PSAS) designs, builds, and launches high power rockets. Their 2013 Capstone project is a power management and communications solution for use in both their current and next generation launch vehicles.  To accommodate the size and weight restrictions imposed by the physical characteristics of the current launch vehicle, the decision was made to pursue a highly integrated solution which would provide for all the power management functions as well as provide low latency communication between all of the electronic subsystems used in-flight on a single 6-layer PCB with components placed on both sides.</a:t>
+              <a:t>The capstone sponsor, Portland State Aerospace Society (PSAS</a:t>
+            </a:r>
+            <a:r>
+              <a:rPr lang="en-US" sz="3000" dirty="0" smtClean="0">
+                <a:latin typeface="Verdana" pitchFamily="34" charset="0"/>
+              </a:rPr>
+              <a:t>), </a:t>
+            </a:r>
+            <a:r>
+              <a:rPr lang="en-US" sz="3000" dirty="0" smtClean="0">
+                <a:latin typeface="Verdana" pitchFamily="34" charset="0"/>
+              </a:rPr>
+              <a:t>designs, builds, and launches </a:t>
+            </a:r>
+            <a:r>
+              <a:rPr lang="en-US" sz="3000" dirty="0" smtClean="0">
+                <a:latin typeface="Verdana" pitchFamily="34" charset="0"/>
+              </a:rPr>
+              <a:t>high-power </a:t>
+            </a:r>
+            <a:r>
+              <a:rPr lang="en-US" sz="3000" dirty="0" smtClean="0">
+                <a:latin typeface="Verdana" pitchFamily="34" charset="0"/>
+              </a:rPr>
+              <a:t>rockets. Their 2013 Capstone project is a power management and communications solution for use in both their current and next generation launch vehicles.  To accommodate the size and weight restrictions imposed by the physical characteristics of the current launch vehicle, the decision was made to pursue a highly integrated solution which would provide for all the power management functions as well as provide low latency communication between all of the electronic subsystems used in-flight on a single 6-layer PCB with components placed on both sides.</a:t>
             </a:r>
           </a:p>
         </p:txBody>
@@ -3329,25 +3353,7 @@
                 </a:solidFill>
                 <a:latin typeface="Garamond" pitchFamily="18" charset="0"/>
               </a:rPr>
-              <a:t> Hub </a:t>
-            </a:r>
-            <a:r>
-              <a:rPr lang="en-US" sz="15800" b="1" cap="small" dirty="0" smtClean="0">
-                <a:solidFill>
-                  <a:srgbClr val="6A7F10"/>
-                </a:solidFill>
-                <a:latin typeface="Garamond" pitchFamily="18" charset="0"/>
-              </a:rPr>
-              <a:t>| </a:t>
-            </a:r>
-            <a:r>
-              <a:rPr lang="en-US" sz="15800" b="1" cap="small" dirty="0" smtClean="0">
-                <a:solidFill>
-                  <a:srgbClr val="6A7F10"/>
-                </a:solidFill>
-                <a:latin typeface="Garamond" pitchFamily="18" charset="0"/>
-              </a:rPr>
-              <a:t>Capstone 2012-2013</a:t>
+              <a:t> Hub | Capstone 2012-2013</a:t>
             </a:r>
             <a:endParaRPr lang="en-US" sz="15800" b="1" cap="small" dirty="0">
               <a:solidFill>
@@ -3366,8 +3372,8 @@
         </p:nvSpPr>
         <p:spPr>
           <a:xfrm>
-            <a:off x="2057400" y="11277600"/>
-            <a:ext cx="13868400" cy="5355312"/>
+            <a:off x="17152542" y="9656088"/>
+            <a:ext cx="10508058" cy="5355312"/>
           </a:xfrm>
           <a:prstGeom prst="rect">
             <a:avLst/>
@@ -3472,8 +3478,8 @@
         </p:nvSpPr>
         <p:spPr>
           <a:xfrm>
-            <a:off x="18023156" y="5257800"/>
-            <a:ext cx="23414048" cy="11356955"/>
+            <a:off x="1247274" y="15985450"/>
+            <a:ext cx="25117926" cy="12741950"/>
           </a:xfrm>
           <a:prstGeom prst="rect">
             <a:avLst/>
@@ -3518,7 +3524,19 @@
               <a:rPr lang="en-US" sz="3000" dirty="0" smtClean="0">
                 <a:latin typeface="Verdana" pitchFamily="34" charset="0"/>
               </a:rPr>
-              <a:t>Initially specified as USB, the communications subsystem was then changed to operate using the CAN Bus due to latency. This was then re-specified again to use 100Mbps Ethernet.  A 10/100 Mbps 8+1 port switch-on-chip from </a:t>
+              <a:t>Initially specified as USB, the communications subsystem was </a:t>
+            </a:r>
+            <a:r>
+              <a:rPr lang="en-US" sz="3000" dirty="0" smtClean="0">
+                <a:latin typeface="Verdana" pitchFamily="34" charset="0"/>
+              </a:rPr>
+              <a:t>changed </a:t>
+            </a:r>
+            <a:r>
+              <a:rPr lang="en-US" sz="3000" dirty="0" smtClean="0">
+                <a:latin typeface="Verdana" pitchFamily="34" charset="0"/>
+              </a:rPr>
+              <a:t>to operate using the CAN Bus due to latency. This was then re-specified again to use 100Mbps Ethernet.  A 10/100 Mbps 8+1 port switch-on-chip from </a:t>
             </a:r>
             <a:r>
               <a:rPr lang="en-US" sz="3000" dirty="0" err="1" smtClean="0">
@@ -3530,7 +3548,19 @@
               <a:rPr lang="en-US" sz="3000" dirty="0" smtClean="0">
                 <a:latin typeface="Verdana" pitchFamily="34" charset="0"/>
               </a:rPr>
-              <a:t> was selected as it was the only device with the required functionality available to small scale designers. </a:t>
+              <a:t> was selected as it was the only device with the required functionality available to </a:t>
+            </a:r>
+            <a:r>
+              <a:rPr lang="en-US" sz="3000" dirty="0" smtClean="0">
+                <a:latin typeface="Verdana" pitchFamily="34" charset="0"/>
+              </a:rPr>
+              <a:t>small-scale </a:t>
+            </a:r>
+            <a:r>
+              <a:rPr lang="en-US" sz="3000" dirty="0" smtClean="0">
+                <a:latin typeface="Verdana" pitchFamily="34" charset="0"/>
+              </a:rPr>
+              <a:t>designers. </a:t>
             </a:r>
             <a:endParaRPr lang="en-US" sz="3000" dirty="0">
               <a:latin typeface="Verdana" pitchFamily="34" charset="0"/>
@@ -3560,7 +3590,19 @@
               <a:rPr lang="en-US" sz="3000" dirty="0" smtClean="0">
                 <a:latin typeface="Verdana" pitchFamily="34" charset="0"/>
               </a:rPr>
-              <a:t>PSAS had recently switched to STM32 microcontrollers for their nodes and requested that the same MCU be used to control this board. It is a compact ARM Cortex based microcontroller that is well suited to scalable embedded designs. The MCU’s primary functions are to control the battery charger, Ethernet switch, and each node’s power switch. Secondary functions are monitoring the battery’s charge state, current consumption of each node, and to reset the Ethernet switch if it enters a fault condition.</a:t>
+              <a:t>PSAS </a:t>
+            </a:r>
+            <a:r>
+              <a:rPr lang="en-US" sz="3000" dirty="0" smtClean="0">
+                <a:latin typeface="Verdana" pitchFamily="34" charset="0"/>
+              </a:rPr>
+              <a:t>recently </a:t>
+            </a:r>
+            <a:r>
+              <a:rPr lang="en-US" sz="3000" dirty="0" smtClean="0">
+                <a:latin typeface="Verdana" pitchFamily="34" charset="0"/>
+              </a:rPr>
+              <a:t>switched to STM32 microcontrollers for their nodes and requested that the same MCU be used to control this board. It is a compact ARM Cortex based microcontroller that is well suited to scalable embedded designs. The MCU’s primary functions are to control the battery charger, Ethernet switch, and each node’s power switch. Secondary functions are monitoring the battery’s charge state, current consumption of each node, and to reset the Ethernet switch if it enters a fault condition.</a:t>
             </a:r>
             <a:endParaRPr lang="en-US" sz="3000" dirty="0">
               <a:latin typeface="Verdana" pitchFamily="34" charset="0"/>
@@ -3596,7 +3638,19 @@
               <a:rPr lang="en-US" sz="3000" dirty="0" smtClean="0">
                 <a:latin typeface="Verdana" pitchFamily="34" charset="0"/>
               </a:rPr>
-              <a:t> battery pack. These feed the high voltage domain that powers the seven nodes and the 3.3V switching regulator. The 3.3V power domain supplies the onboard logic and a 2.1V LDO . The 2.1V power domain is used by the Ethernet  switch.</a:t>
+              <a:t> battery pack. These feed the high voltage domain that powers the seven nodes and the 3.3V switching regulator. The 3.3V power domain supplies the onboard logic and a 2.1V </a:t>
+            </a:r>
+            <a:r>
+              <a:rPr lang="en-US" sz="3000" dirty="0" smtClean="0">
+                <a:latin typeface="Verdana" pitchFamily="34" charset="0"/>
+              </a:rPr>
+              <a:t>LDO. </a:t>
+            </a:r>
+            <a:r>
+              <a:rPr lang="en-US" sz="3000" dirty="0" smtClean="0">
+                <a:latin typeface="Verdana" pitchFamily="34" charset="0"/>
+              </a:rPr>
+              <a:t>The 2.1V power domain is used by the Ethernet  switch.</a:t>
             </a:r>
           </a:p>
           <a:p>
@@ -3617,7 +3671,19 @@
               <a:rPr lang="en-US" sz="3000" dirty="0" smtClean="0">
                 <a:latin typeface="Verdana" pitchFamily="34" charset="0"/>
               </a:rPr>
-              <a:t>Each of the seven nodes can be switched on or off by the MCU. By using a hot swop controller with integrated power FET, </a:t>
+              <a:t>Each of the seven nodes can be switched on or off by the MCU. By using a hot </a:t>
+            </a:r>
+            <a:r>
+              <a:rPr lang="en-US" sz="3000" dirty="0" smtClean="0">
+                <a:latin typeface="Verdana" pitchFamily="34" charset="0"/>
+              </a:rPr>
+              <a:t>swap </a:t>
+            </a:r>
+            <a:r>
+              <a:rPr lang="en-US" sz="3000" dirty="0" smtClean="0">
+                <a:latin typeface="Verdana" pitchFamily="34" charset="0"/>
+              </a:rPr>
+              <a:t>controller with integrated power FET, </a:t>
             </a:r>
             <a:r>
               <a:rPr lang="en-US" sz="3000" dirty="0">
@@ -3629,47 +3695,59 @@
               <a:rPr lang="en-US" sz="3000" dirty="0" smtClean="0">
                 <a:latin typeface="Verdana" pitchFamily="34" charset="0"/>
               </a:rPr>
-              <a:t>his solution allows for current ramping when a node is turned on, fault handling, and current monitoring all from a single 4mm x 4mm IC.</a:t>
-            </a:r>
+              <a:t>his solution allows for current ramping when a node is turned on, fault handling, and current monitoring all from a single 4mm x 4mm IC</a:t>
+            </a:r>
+            <a:r>
+              <a:rPr lang="en-US" sz="3000" dirty="0" smtClean="0">
+                <a:latin typeface="Verdana" pitchFamily="34" charset="0"/>
+              </a:rPr>
+              <a:t>.</a:t>
+            </a:r>
+          </a:p>
+          <a:p>
             <a:endParaRPr lang="en-US" sz="3000" dirty="0">
               <a:latin typeface="Verdana" pitchFamily="34" charset="0"/>
             </a:endParaRPr>
           </a:p>
-        </p:txBody>
-      </p:sp>
-      <p:sp>
-        <p:nvSpPr>
-          <p:cNvPr id="20" name="TextBox 19"/>
-          <p:cNvSpPr txBox="1"/>
-          <p:nvPr/>
-        </p:nvSpPr>
-        <p:spPr>
-          <a:xfrm>
-            <a:off x="7742251" y="17565469"/>
-            <a:ext cx="5037918" cy="646331"/>
-          </a:xfrm>
-          <a:prstGeom prst="rect">
-            <a:avLst/>
-          </a:prstGeom>
-          <a:noFill/>
-        </p:spPr>
-        <p:txBody>
-          <a:bodyPr wrap="none" rtlCol="0">
-            <a:spAutoFit/>
-          </a:bodyPr>
-          <a:lstStyle/>
-          <a:p>
-            <a:r>
-              <a:rPr lang="en-US" sz="3600" b="1" dirty="0" smtClean="0"/>
-              <a:t>High-Level Block Diagram</a:t>
-            </a:r>
-            <a:endParaRPr lang="en-US" sz="3600" b="1" dirty="0"/>
+          <a:p>
+            <a:r>
+              <a:rPr lang="en-US" sz="3000" b="1" dirty="0" smtClean="0">
+                <a:latin typeface="Verdana" pitchFamily="34" charset="0"/>
+              </a:rPr>
+              <a:t>Battery Charger:</a:t>
+            </a:r>
+            <a:endParaRPr lang="en-US" sz="3000" dirty="0" smtClean="0">
+              <a:latin typeface="Verdana" pitchFamily="34" charset="0"/>
+            </a:endParaRPr>
+          </a:p>
+          <a:p>
+            <a:r>
+              <a:rPr lang="en-US" sz="3000" dirty="0" smtClean="0">
+                <a:latin typeface="Verdana" pitchFamily="34" charset="0"/>
+              </a:rPr>
+              <a:t>The battery charging circuit allows for shore power to connect and recharge the </a:t>
+            </a:r>
+            <a:r>
+              <a:rPr lang="en-US" sz="3000" dirty="0" err="1" smtClean="0">
+                <a:latin typeface="Verdana" pitchFamily="34" charset="0"/>
+              </a:rPr>
+              <a:t>LiPo</a:t>
+            </a:r>
+            <a:r>
+              <a:rPr lang="en-US" sz="3000" dirty="0" smtClean="0">
+                <a:latin typeface="Verdana" pitchFamily="34" charset="0"/>
+              </a:rPr>
+              <a:t> battery as well as supply power to the rest of the board.</a:t>
+            </a:r>
+            <a:endParaRPr lang="en-US" sz="3000" dirty="0">
+              <a:latin typeface="Verdana" pitchFamily="34" charset="0"/>
+            </a:endParaRPr>
           </a:p>
         </p:txBody>
       </p:sp>
       <p:pic>
         <p:nvPicPr>
-          <p:cNvPr id="9" name="Picture 2"/>
+          <p:cNvPr id="1026" name="Picture 2"/>
           <p:cNvPicPr>
             <a:picLocks noChangeAspect="1" noChangeArrowheads="1"/>
           </p:cNvPicPr>
@@ -3689,48 +3767,8 @@
         </p:blipFill>
         <p:spPr bwMode="auto">
           <a:xfrm>
-            <a:off x="2057400" y="18211800"/>
-            <a:ext cx="16407620" cy="11331684"/>
-          </a:xfrm>
-          <a:prstGeom prst="rect">
-            <a:avLst/>
-          </a:prstGeom>
-          <a:noFill/>
-          <a:extLst>
-            <a:ext uri="{909E8E84-426E-40DD-AFC4-6F175D3DCCD1}">
-              <a14:hiddenFill xmlns:a14="http://schemas.microsoft.com/office/drawing/2010/main">
-                <a:solidFill>
-                  <a:srgbClr val="FFFFFF"/>
-                </a:solidFill>
-              </a14:hiddenFill>
-            </a:ext>
-          </a:extLst>
-        </p:spPr>
-      </p:pic>
-      <p:pic>
-        <p:nvPicPr>
-          <p:cNvPr id="1026" name="Picture 2"/>
-          <p:cNvPicPr>
-            <a:picLocks noChangeAspect="1" noChangeArrowheads="1"/>
-          </p:cNvPicPr>
-          <p:nvPr/>
-        </p:nvPicPr>
-        <p:blipFill>
-          <a:blip r:embed="rId5">
-            <a:extLst>
-              <a:ext uri="{28A0092B-C50C-407E-A947-70E740481C1C}">
-                <a14:useLocalDpi xmlns:a14="http://schemas.microsoft.com/office/drawing/2010/main" val="0"/>
-              </a:ext>
-            </a:extLst>
-          </a:blip>
-          <a:stretch>
-            <a:fillRect/>
-          </a:stretch>
-        </p:blipFill>
-        <p:spPr bwMode="auto">
-          <a:xfrm>
-            <a:off x="22522715" y="17370927"/>
-            <a:ext cx="17932801" cy="12270873"/>
+            <a:off x="26851029" y="18849544"/>
+            <a:ext cx="15705813" cy="10747012"/>
           </a:xfrm>
           <a:prstGeom prst="rect">
             <a:avLst/>
@@ -4024,6 +4062,88 @@
           </a:p>
         </p:txBody>
       </p:sp>
+      <p:pic>
+        <p:nvPicPr>
+          <p:cNvPr id="1027" name="Picture 3" descr="C:\Users\HP-Elitebook\repos\avionics-cad\av3\rocketnet-hub\block_diagrams\fullblock-higherlevel.png"/>
+          <p:cNvPicPr>
+            <a:picLocks noChangeAspect="1" noChangeArrowheads="1"/>
+          </p:cNvPicPr>
+          <p:nvPr/>
+        </p:nvPicPr>
+        <p:blipFill>
+          <a:blip r:embed="rId5" cstate="print">
+            <a:extLst>
+              <a:ext uri="{28A0092B-C50C-407E-A947-70E740481C1C}">
+                <a14:useLocalDpi xmlns:a14="http://schemas.microsoft.com/office/drawing/2010/main" val="0"/>
+              </a:ext>
+            </a:extLst>
+          </a:blip>
+          <a:srcRect/>
+          <a:stretch>
+            <a:fillRect/>
+          </a:stretch>
+        </p:blipFill>
+        <p:spPr bwMode="auto">
+          <a:xfrm>
+            <a:off x="1219200" y="5181600"/>
+            <a:ext cx="15617396" cy="9829800"/>
+          </a:xfrm>
+          <a:prstGeom prst="rect">
+            <a:avLst/>
+          </a:prstGeom>
+          <a:noFill/>
+          <a:extLst>
+            <a:ext uri="{909E8E84-426E-40DD-AFC4-6F175D3DCCD1}">
+              <a14:hiddenFill xmlns:a14="http://schemas.microsoft.com/office/drawing/2010/main">
+                <a:solidFill>
+                  <a:srgbClr val="FFFFFF"/>
+                </a:solidFill>
+              </a14:hiddenFill>
+            </a:ext>
+          </a:extLst>
+        </p:spPr>
+      </p:pic>
+      <p:pic>
+        <p:nvPicPr>
+          <p:cNvPr id="1028" name="Picture 4" descr="C:\Users\HP-Elitebook\repos\avionics-cad\av3\rocketnet-hub\block_diagrams\blockdiagram.png"/>
+          <p:cNvPicPr>
+            <a:picLocks noChangeAspect="1" noChangeArrowheads="1"/>
+          </p:cNvPicPr>
+          <p:nvPr/>
+        </p:nvPicPr>
+        <p:blipFill>
+          <a:blip r:embed="rId6" cstate="print">
+            <a:extLst>
+              <a:ext uri="{28A0092B-C50C-407E-A947-70E740481C1C}">
+                <a14:useLocalDpi xmlns:a14="http://schemas.microsoft.com/office/drawing/2010/main" val="0"/>
+              </a:ext>
+            </a:extLst>
+          </a:blip>
+          <a:srcRect/>
+          <a:stretch>
+            <a:fillRect/>
+          </a:stretch>
+        </p:blipFill>
+        <p:spPr bwMode="auto">
+          <a:xfrm>
+            <a:off x="28170214" y="8882523"/>
+            <a:ext cx="13067441" cy="9710277"/>
+          </a:xfrm>
+          <a:prstGeom prst="rect">
+            <a:avLst/>
+          </a:prstGeom>
+          <a:noFill/>
+          <a:extLst>
+            <a:ext uri="{909E8E84-426E-40DD-AFC4-6F175D3DCCD1}">
+              <a14:hiddenFill xmlns:a14="http://schemas.microsoft.com/office/drawing/2010/main">
+                <a:solidFill>
+                  <a:srgbClr val="FFFFFF"/>
+                </a:solidFill>
+              </a14:hiddenFill>
+            </a:ext>
+          </a:extLst>
+        </p:spPr>
+      </p:pic>
     </p:spTree>
   </p:cSld>
   <p:clrMapOvr>

</xml_diff>

<commit_message>
Formatted text/images on poster
</commit_message>
<xml_diff>
--- a/av3/rocketnet-hub/poster/RocketNetHub_Poster_woodruff.pptx
+++ b/av3/rocketnet-hub/poster/RocketNetHub_Poster_woodruff.pptx
@@ -3238,7 +3238,7 @@
         <p:spPr>
           <a:xfrm>
             <a:off x="17171743" y="4876800"/>
-            <a:ext cx="24357257" cy="3952548"/>
+            <a:ext cx="24357257" cy="4875877"/>
           </a:xfrm>
           <a:prstGeom prst="rect">
             <a:avLst/>
@@ -3266,7 +3266,67 @@
               <a:rPr lang="en-US" sz="3000" dirty="0" smtClean="0">
                 <a:latin typeface="Verdana" pitchFamily="34" charset="0"/>
               </a:rPr>
-              <a:t>The capstone sponsor, Portland State Aerospace Society (PSAS), designs, builds, and launches high-power rockets. Their 2013 Capstone project is a power management and communications solution for use in both their current and next generation launch vehicles.  To accommodate the size and weight restrictions imposed by the physical characteristics of the current launch vehicle, the decision was made to pursue a highly integrated solution which would provide for all the power management functions as well as provide low latency communication between all of the electronic subsystems used in-flight on a single 6-layer PCB with components placed on both sides.</a:t>
+              <a:t>The capstone sponsor, Portland State Aerospace Society (PSAS), designs, builds, and launches high-power rockets. Their 2013 Capstone project is a power management and communications solution for use in both their current and next generation launch vehicles.  To accommodate the size and weight restrictions imposed by the physical characteristics of the current launch vehicle, the decision was made to pursue a highly integrated solution which would provide for all the power management functions as well as provide </a:t>
+            </a:r>
+            <a:r>
+              <a:rPr lang="en-US" sz="3000" dirty="0" smtClean="0">
+                <a:latin typeface="Verdana" pitchFamily="34" charset="0"/>
+              </a:rPr>
+              <a:t>low</a:t>
+            </a:r>
+          </a:p>
+          <a:p>
+            <a:r>
+              <a:rPr lang="en-US" sz="3000" dirty="0" smtClean="0">
+                <a:latin typeface="Verdana" pitchFamily="34" charset="0"/>
+              </a:rPr>
+              <a:t>Latency communication </a:t>
+            </a:r>
+            <a:r>
+              <a:rPr lang="en-US" sz="3000" dirty="0" smtClean="0">
+                <a:latin typeface="Verdana" pitchFamily="34" charset="0"/>
+              </a:rPr>
+              <a:t>between all of the </a:t>
+            </a:r>
+            <a:r>
+              <a:rPr lang="en-US" sz="3000" dirty="0" smtClean="0">
+                <a:latin typeface="Verdana" pitchFamily="34" charset="0"/>
+              </a:rPr>
+              <a:t>electronic</a:t>
+            </a:r>
+          </a:p>
+          <a:p>
+            <a:r>
+              <a:rPr lang="en-US" sz="3000" dirty="0" smtClean="0">
+                <a:latin typeface="Verdana" pitchFamily="34" charset="0"/>
+              </a:rPr>
+              <a:t>Subsystems used </a:t>
+            </a:r>
+            <a:r>
+              <a:rPr lang="en-US" sz="3000" dirty="0" smtClean="0">
+                <a:latin typeface="Verdana" pitchFamily="34" charset="0"/>
+              </a:rPr>
+              <a:t>in-flight on a single 6-layer </a:t>
+            </a:r>
+            <a:r>
+              <a:rPr lang="en-US" sz="3000" dirty="0" smtClean="0">
+                <a:latin typeface="Verdana" pitchFamily="34" charset="0"/>
+              </a:rPr>
+              <a:t>PCB</a:t>
+            </a:r>
+          </a:p>
+          <a:p>
+            <a:r>
+              <a:rPr lang="en-US" sz="3000" dirty="0" smtClean="0">
+                <a:latin typeface="Verdana" pitchFamily="34" charset="0"/>
+              </a:rPr>
+              <a:t>with components placed on </a:t>
+            </a:r>
+            <a:r>
+              <a:rPr lang="en-US" sz="3000" dirty="0" smtClean="0">
+                <a:latin typeface="Verdana" pitchFamily="34" charset="0"/>
+              </a:rPr>
+              <a:t>both sides.</a:t>
             </a:r>
           </a:p>
         </p:txBody>
@@ -3348,8 +3408,8 @@
         </p:nvSpPr>
         <p:spPr>
           <a:xfrm>
-            <a:off x="17152542" y="9656088"/>
-            <a:ext cx="10508058" cy="6740307"/>
+            <a:off x="17152542" y="10163257"/>
+            <a:ext cx="10508058" cy="6278642"/>
           </a:xfrm>
           <a:prstGeom prst="rect">
             <a:avLst/>
@@ -3370,7 +3430,7 @@
             </a:r>
           </a:p>
           <a:p>
-            <a:pPr marL="1143000" indent="-1143000">
+            <a:pPr marL="568325" indent="-568325">
               <a:buFont typeface="Arial" pitchFamily="34" charset="0"/>
               <a:buChar char="•"/>
             </a:pPr>
@@ -3382,7 +3442,7 @@
             </a:r>
           </a:p>
           <a:p>
-            <a:pPr marL="1143000" indent="-1143000">
+            <a:pPr marL="568325" indent="-568325">
               <a:buFont typeface="Arial" pitchFamily="34" charset="0"/>
               <a:buChar char="•"/>
             </a:pPr>
@@ -3394,7 +3454,7 @@
             </a:r>
           </a:p>
           <a:p>
-            <a:pPr marL="1143000" indent="-1143000">
+            <a:pPr marL="568325" indent="-568325">
               <a:buFont typeface="Arial" pitchFamily="34" charset="0"/>
               <a:buChar char="•"/>
             </a:pPr>
@@ -3409,7 +3469,7 @@
             </a:endParaRPr>
           </a:p>
           <a:p>
-            <a:pPr marL="1143000" indent="-1143000">
+            <a:pPr marL="568325" indent="-568325">
               <a:buFont typeface="Arial" pitchFamily="34" charset="0"/>
               <a:buChar char="•"/>
             </a:pPr>
@@ -3421,7 +3481,7 @@
             </a:r>
           </a:p>
           <a:p>
-            <a:pPr marL="1143000" indent="-1143000">
+            <a:pPr marL="568325" indent="-568325">
               <a:buFont typeface="Arial" pitchFamily="34" charset="0"/>
               <a:buChar char="•"/>
             </a:pPr>
@@ -3433,7 +3493,7 @@
             </a:r>
           </a:p>
           <a:p>
-            <a:pPr marL="1143000" indent="-1143000">
+            <a:pPr marL="568325" indent="-568325">
               <a:buFont typeface="Arial" pitchFamily="34" charset="0"/>
               <a:buChar char="•"/>
             </a:pPr>
@@ -3441,17 +3501,11 @@
               <a:rPr lang="en-US" sz="3000" dirty="0" smtClean="0">
                 <a:latin typeface="Verdana" pitchFamily="34" charset="0"/>
               </a:rPr>
-              <a:t>Low-power consumption when in standby </a:t>
-            </a:r>
-            <a:r>
-              <a:rPr lang="en-US" sz="3000" dirty="0" smtClean="0">
-                <a:latin typeface="Verdana" pitchFamily="34" charset="0"/>
-              </a:rPr>
-              <a:t>mode</a:t>
-            </a:r>
-          </a:p>
-          <a:p>
-            <a:pPr marL="1143000" indent="-1143000">
+              <a:t>Low-power consumption when in standby mode</a:t>
+            </a:r>
+          </a:p>
+          <a:p>
+            <a:pPr marL="568325" indent="-568325">
               <a:buFont typeface="Arial" pitchFamily="34" charset="0"/>
               <a:buChar char="•"/>
             </a:pPr>
@@ -3479,9 +3533,6 @@
               </a:rPr>
               <a:t>hours</a:t>
             </a:r>
-            <a:endParaRPr lang="en-US" sz="3000" dirty="0" smtClean="0">
-              <a:latin typeface="Verdana" pitchFamily="34" charset="0"/>
-            </a:endParaRPr>
           </a:p>
         </p:txBody>
       </p:sp>
@@ -4075,7 +4126,7 @@
         </p:blipFill>
         <p:spPr bwMode="auto">
           <a:xfrm>
-            <a:off x="28170214" y="8882523"/>
+            <a:off x="28170214" y="8425323"/>
             <a:ext cx="13067441" cy="9710277"/>
           </a:xfrm>
           <a:prstGeom prst="rect">

</xml_diff>

<commit_message>
Removed old poster, added updated layout image
</commit_message>
<xml_diff>
--- a/av3/rocketnet-hub/poster/RocketNetHub_Poster_woodruff.pptx
+++ b/av3/rocketnet-hub/poster/RocketNetHub_Poster_woodruff.pptx
@@ -289,7 +289,7 @@
             <a:fld id="{D9D26CB9-01E4-44B8-8084-BCC418CF4A2D}" type="datetimeFigureOut">
               <a:rPr lang="en-US" smtClean="0"/>
               <a:pPr/>
-              <a:t>6/2/2013</a:t>
+              <a:t>6/3/2013</a:t>
             </a:fld>
             <a:endParaRPr lang="en-US"/>
           </a:p>
@@ -456,7 +456,7 @@
             <a:fld id="{D9D26CB9-01E4-44B8-8084-BCC418CF4A2D}" type="datetimeFigureOut">
               <a:rPr lang="en-US" smtClean="0"/>
               <a:pPr/>
-              <a:t>6/2/2013</a:t>
+              <a:t>6/3/2013</a:t>
             </a:fld>
             <a:endParaRPr lang="en-US"/>
           </a:p>
@@ -633,7 +633,7 @@
             <a:fld id="{D9D26CB9-01E4-44B8-8084-BCC418CF4A2D}" type="datetimeFigureOut">
               <a:rPr lang="en-US" smtClean="0"/>
               <a:pPr/>
-              <a:t>6/2/2013</a:t>
+              <a:t>6/3/2013</a:t>
             </a:fld>
             <a:endParaRPr lang="en-US"/>
           </a:p>
@@ -800,7 +800,7 @@
             <a:fld id="{D9D26CB9-01E4-44B8-8084-BCC418CF4A2D}" type="datetimeFigureOut">
               <a:rPr lang="en-US" smtClean="0"/>
               <a:pPr/>
-              <a:t>6/2/2013</a:t>
+              <a:t>6/3/2013</a:t>
             </a:fld>
             <a:endParaRPr lang="en-US"/>
           </a:p>
@@ -1043,7 +1043,7 @@
             <a:fld id="{D9D26CB9-01E4-44B8-8084-BCC418CF4A2D}" type="datetimeFigureOut">
               <a:rPr lang="en-US" smtClean="0"/>
               <a:pPr/>
-              <a:t>6/2/2013</a:t>
+              <a:t>6/3/2013</a:t>
             </a:fld>
             <a:endParaRPr lang="en-US"/>
           </a:p>
@@ -1328,7 +1328,7 @@
             <a:fld id="{D9D26CB9-01E4-44B8-8084-BCC418CF4A2D}" type="datetimeFigureOut">
               <a:rPr lang="en-US" smtClean="0"/>
               <a:pPr/>
-              <a:t>6/2/2013</a:t>
+              <a:t>6/3/2013</a:t>
             </a:fld>
             <a:endParaRPr lang="en-US"/>
           </a:p>
@@ -1747,7 +1747,7 @@
             <a:fld id="{D9D26CB9-01E4-44B8-8084-BCC418CF4A2D}" type="datetimeFigureOut">
               <a:rPr lang="en-US" smtClean="0"/>
               <a:pPr/>
-              <a:t>6/2/2013</a:t>
+              <a:t>6/3/2013</a:t>
             </a:fld>
             <a:endParaRPr lang="en-US"/>
           </a:p>
@@ -1862,7 +1862,7 @@
             <a:fld id="{D9D26CB9-01E4-44B8-8084-BCC418CF4A2D}" type="datetimeFigureOut">
               <a:rPr lang="en-US" smtClean="0"/>
               <a:pPr/>
-              <a:t>6/2/2013</a:t>
+              <a:t>6/3/2013</a:t>
             </a:fld>
             <a:endParaRPr lang="en-US"/>
           </a:p>
@@ -1954,7 +1954,7 @@
             <a:fld id="{D9D26CB9-01E4-44B8-8084-BCC418CF4A2D}" type="datetimeFigureOut">
               <a:rPr lang="en-US" smtClean="0"/>
               <a:pPr/>
-              <a:t>6/2/2013</a:t>
+              <a:t>6/3/2013</a:t>
             </a:fld>
             <a:endParaRPr lang="en-US"/>
           </a:p>
@@ -2228,7 +2228,7 @@
             <a:fld id="{D9D26CB9-01E4-44B8-8084-BCC418CF4A2D}" type="datetimeFigureOut">
               <a:rPr lang="en-US" smtClean="0"/>
               <a:pPr/>
-              <a:t>6/2/2013</a:t>
+              <a:t>6/3/2013</a:t>
             </a:fld>
             <a:endParaRPr lang="en-US"/>
           </a:p>
@@ -2478,7 +2478,7 @@
             <a:fld id="{D9D26CB9-01E4-44B8-8084-BCC418CF4A2D}" type="datetimeFigureOut">
               <a:rPr lang="en-US" smtClean="0"/>
               <a:pPr/>
-              <a:t>6/2/2013</a:t>
+              <a:t>6/3/2013</a:t>
             </a:fld>
             <a:endParaRPr lang="en-US"/>
           </a:p>
@@ -2688,7 +2688,7 @@
             <a:fld id="{D9D26CB9-01E4-44B8-8084-BCC418CF4A2D}" type="datetimeFigureOut">
               <a:rPr lang="en-US" smtClean="0"/>
               <a:pPr/>
-              <a:t>6/2/2013</a:t>
+              <a:t>6/3/2013</a:t>
             </a:fld>
             <a:endParaRPr lang="en-US"/>
           </a:p>
@@ -3237,8 +3237,8 @@
         </p:nvSpPr>
         <p:spPr>
           <a:xfrm>
-            <a:off x="17171743" y="4876800"/>
-            <a:ext cx="24357257" cy="4875877"/>
+            <a:off x="17171744" y="4876800"/>
+            <a:ext cx="24065912" cy="4875877"/>
           </a:xfrm>
           <a:prstGeom prst="rect">
             <a:avLst/>
@@ -3254,6 +3254,7 @@
           </a:bodyPr>
           <a:lstStyle/>
           <a:p>
+            <a:pPr algn="just"/>
             <a:r>
               <a:rPr lang="en-US" sz="7200" b="1" dirty="0" smtClean="0">
                 <a:latin typeface="Verdana" pitchFamily="34" charset="0"/>
@@ -3262,71 +3263,69 @@
             </a:r>
           </a:p>
           <a:p>
+            <a:pPr algn="just"/>
             <a:r>
               <a:rPr lang="en-US" sz="3000" dirty="0" smtClean="0">
                 <a:latin typeface="Verdana" pitchFamily="34" charset="0"/>
               </a:rPr>
-              <a:t>The capstone sponsor, Portland State Aerospace Society (PSAS), designs, builds, and launches high-power rockets. Their 2013 Capstone project is a power management and communications solution for use in both their current and next generation launch vehicles.  To accommodate the size and weight restrictions imposed by the physical characteristics of the current launch vehicle, the decision was made to pursue a highly integrated solution which would provide for all the power management functions as well as provide </a:t>
+              <a:t>The capstone sponsor, Portland State Aerospace Society (PSAS), designs, builds, and launches high-power rockets. Their 2013 Capstone project is a power management and communications solution for use in both their current and next generation launch vehicles.  To accommodate the size and weight restrictions imposed by the physical characteristics of the current launch vehicle, the decision was made to pursue a highly integrated solution which would provide for all the power management functions as well as provide low</a:t>
+            </a:r>
+          </a:p>
+          <a:p>
+            <a:pPr algn="just"/>
+            <a:r>
+              <a:rPr lang="en-US" sz="3000" dirty="0">
+                <a:latin typeface="Verdana" pitchFamily="34" charset="0"/>
+              </a:rPr>
+              <a:t>l</a:t>
             </a:r>
             <a:r>
               <a:rPr lang="en-US" sz="3000" dirty="0" smtClean="0">
                 <a:latin typeface="Verdana" pitchFamily="34" charset="0"/>
               </a:rPr>
-              <a:t>low</a:t>
-            </a:r>
-          </a:p>
-          <a:p>
+              <a:t>atency </a:t>
+            </a:r>
             <a:r>
               <a:rPr lang="en-US" sz="3000" dirty="0" smtClean="0">
                 <a:latin typeface="Verdana" pitchFamily="34" charset="0"/>
               </a:rPr>
-              <a:t>Latency communication </a:t>
+              <a:t>communication between all of the </a:t>
             </a:r>
             <a:r>
               <a:rPr lang="en-US" sz="3000" dirty="0" smtClean="0">
                 <a:latin typeface="Verdana" pitchFamily="34" charset="0"/>
               </a:rPr>
-              <a:t>between all of the </a:t>
+              <a:t>electronic</a:t>
+            </a:r>
+          </a:p>
+          <a:p>
+            <a:pPr algn="just"/>
+            <a:r>
+              <a:rPr lang="en-US" sz="3000" dirty="0">
+                <a:latin typeface="Verdana" pitchFamily="34" charset="0"/>
+              </a:rPr>
+              <a:t>s</a:t>
             </a:r>
             <a:r>
               <a:rPr lang="en-US" sz="3000" dirty="0" smtClean="0">
                 <a:latin typeface="Verdana" pitchFamily="34" charset="0"/>
               </a:rPr>
-              <a:t>electronic</a:t>
-            </a:r>
-          </a:p>
-          <a:p>
+              <a:t>ubsystems </a:t>
+            </a:r>
             <a:r>
               <a:rPr lang="en-US" sz="3000" dirty="0" smtClean="0">
                 <a:latin typeface="Verdana" pitchFamily="34" charset="0"/>
               </a:rPr>
-              <a:t>Subsystems used </a:t>
-            </a:r>
+              <a:t>used in-flight on a single 6-layer PCB</a:t>
+            </a:r>
+          </a:p>
+          <a:p>
+            <a:pPr algn="just"/>
             <a:r>
               <a:rPr lang="en-US" sz="3000" dirty="0" smtClean="0">
                 <a:latin typeface="Verdana" pitchFamily="34" charset="0"/>
               </a:rPr>
-              <a:t>in-flight on a single 6-layer </a:t>
-            </a:r>
-            <a:r>
-              <a:rPr lang="en-US" sz="3000" dirty="0" smtClean="0">
-                <a:latin typeface="Verdana" pitchFamily="34" charset="0"/>
-              </a:rPr>
-              <a:t>PCB</a:t>
-            </a:r>
-          </a:p>
-          <a:p>
-            <a:r>
-              <a:rPr lang="en-US" sz="3000" dirty="0" smtClean="0">
-                <a:latin typeface="Verdana" pitchFamily="34" charset="0"/>
-              </a:rPr>
-              <a:t>with components placed on </a:t>
-            </a:r>
-            <a:r>
-              <a:rPr lang="en-US" sz="3000" dirty="0" smtClean="0">
-                <a:latin typeface="Verdana" pitchFamily="34" charset="0"/>
-              </a:rPr>
-              <a:t>both sides.</a:t>
+              <a:t>with components placed on both sides.</a:t>
             </a:r>
           </a:p>
         </p:txBody>
@@ -3408,7 +3407,7 @@
         </p:nvSpPr>
         <p:spPr>
           <a:xfrm>
-            <a:off x="17152542" y="10163257"/>
+            <a:off x="17152542" y="10332958"/>
             <a:ext cx="10508058" cy="6278642"/>
           </a:xfrm>
           <a:prstGeom prst="rect">
@@ -3422,6 +3421,7 @@
           </a:bodyPr>
           <a:lstStyle/>
           <a:p>
+            <a:pPr algn="just"/>
             <a:r>
               <a:rPr lang="en-US" sz="7200" b="1" dirty="0" smtClean="0">
                 <a:latin typeface="Verdana" pitchFamily="34" charset="0"/>
@@ -3430,7 +3430,7 @@
             </a:r>
           </a:p>
           <a:p>
-            <a:pPr marL="568325" indent="-568325">
+            <a:pPr marL="568325" indent="-568325" algn="just">
               <a:buFont typeface="Arial" pitchFamily="34" charset="0"/>
               <a:buChar char="•"/>
             </a:pPr>
@@ -3442,7 +3442,7 @@
             </a:r>
           </a:p>
           <a:p>
-            <a:pPr marL="568325" indent="-568325">
+            <a:pPr marL="568325" indent="-568325" algn="just">
               <a:buFont typeface="Arial" pitchFamily="34" charset="0"/>
               <a:buChar char="•"/>
             </a:pPr>
@@ -3454,7 +3454,7 @@
             </a:r>
           </a:p>
           <a:p>
-            <a:pPr marL="568325" indent="-568325">
+            <a:pPr marL="568325" indent="-568325" algn="just">
               <a:buFont typeface="Arial" pitchFamily="34" charset="0"/>
               <a:buChar char="•"/>
             </a:pPr>
@@ -3469,7 +3469,7 @@
             </a:endParaRPr>
           </a:p>
           <a:p>
-            <a:pPr marL="568325" indent="-568325">
+            <a:pPr marL="568325" indent="-568325" algn="just">
               <a:buFont typeface="Arial" pitchFamily="34" charset="0"/>
               <a:buChar char="•"/>
             </a:pPr>
@@ -3481,7 +3481,7 @@
             </a:r>
           </a:p>
           <a:p>
-            <a:pPr marL="568325" indent="-568325">
+            <a:pPr marL="568325" indent="-568325" algn="just">
               <a:buFont typeface="Arial" pitchFamily="34" charset="0"/>
               <a:buChar char="•"/>
             </a:pPr>
@@ -3493,7 +3493,7 @@
             </a:r>
           </a:p>
           <a:p>
-            <a:pPr marL="568325" indent="-568325">
+            <a:pPr marL="568325" indent="-568325" algn="just">
               <a:buFont typeface="Arial" pitchFamily="34" charset="0"/>
               <a:buChar char="•"/>
             </a:pPr>
@@ -3505,7 +3505,7 @@
             </a:r>
           </a:p>
           <a:p>
-            <a:pPr marL="568325" indent="-568325">
+            <a:pPr marL="568325" indent="-568325" algn="just">
               <a:buFont typeface="Arial" pitchFamily="34" charset="0"/>
               <a:buChar char="•"/>
             </a:pPr>
@@ -3544,8 +3544,8 @@
         </p:nvSpPr>
         <p:spPr>
           <a:xfrm>
-            <a:off x="1247274" y="15985450"/>
-            <a:ext cx="25117926" cy="12741950"/>
+            <a:off x="1247274" y="15752385"/>
+            <a:ext cx="24333784" cy="13203615"/>
           </a:xfrm>
           <a:prstGeom prst="rect">
             <a:avLst/>
@@ -3558,6 +3558,7 @@
           </a:bodyPr>
           <a:lstStyle/>
           <a:p>
+            <a:pPr algn="just"/>
             <a:r>
               <a:rPr lang="en-US" sz="7200" b="1" dirty="0" smtClean="0">
                 <a:latin typeface="Verdana" pitchFamily="34" charset="0"/>
@@ -3569,6 +3570,7 @@
             </a:endParaRPr>
           </a:p>
           <a:p>
+            <a:pPr algn="just"/>
             <a:r>
               <a:rPr lang="en-US" sz="3000" b="1" dirty="0" smtClean="0">
                 <a:latin typeface="Verdana" pitchFamily="34" charset="0"/>
@@ -3586,6 +3588,7 @@
             </a:endParaRPr>
           </a:p>
           <a:p>
+            <a:pPr algn="just"/>
             <a:r>
               <a:rPr lang="en-US" sz="3000" dirty="0" smtClean="0">
                 <a:latin typeface="Verdana" pitchFamily="34" charset="0"/>
@@ -3609,11 +3612,13 @@
             </a:endParaRPr>
           </a:p>
           <a:p>
+            <a:pPr algn="just"/>
             <a:endParaRPr lang="en-US" sz="3000" dirty="0">
               <a:latin typeface="Verdana" pitchFamily="34" charset="0"/>
             </a:endParaRPr>
           </a:p>
           <a:p>
+            <a:pPr algn="just"/>
             <a:r>
               <a:rPr lang="en-US" sz="3000" b="1" dirty="0">
                 <a:latin typeface="Verdana" pitchFamily="34" charset="0"/>
@@ -3628,6 +3633,7 @@
             </a:r>
           </a:p>
           <a:p>
+            <a:pPr algn="just"/>
             <a:r>
               <a:rPr lang="en-US" sz="3000" dirty="0" smtClean="0">
                 <a:latin typeface="Verdana" pitchFamily="34" charset="0"/>
@@ -3639,11 +3645,13 @@
             </a:endParaRPr>
           </a:p>
           <a:p>
+            <a:pPr algn="just"/>
             <a:endParaRPr lang="en-US" sz="3000" dirty="0" smtClean="0">
               <a:latin typeface="Verdana" pitchFamily="34" charset="0"/>
             </a:endParaRPr>
           </a:p>
           <a:p>
+            <a:pPr algn="just"/>
             <a:r>
               <a:rPr lang="en-US" sz="3000" b="1" dirty="0" smtClean="0">
                 <a:latin typeface="Verdana" pitchFamily="34" charset="0"/>
@@ -3652,6 +3660,7 @@
             </a:r>
           </a:p>
           <a:p>
+            <a:pPr algn="just"/>
             <a:r>
               <a:rPr lang="en-US" sz="3000" dirty="0" smtClean="0">
                 <a:latin typeface="Verdana" pitchFamily="34" charset="0"/>
@@ -3672,11 +3681,13 @@
             </a:r>
           </a:p>
           <a:p>
+            <a:pPr algn="just"/>
             <a:endParaRPr lang="en-US" sz="3000" dirty="0">
               <a:latin typeface="Verdana" pitchFamily="34" charset="0"/>
             </a:endParaRPr>
           </a:p>
           <a:p>
+            <a:pPr algn="just"/>
             <a:r>
               <a:rPr lang="en-US" sz="3000" b="1" dirty="0" smtClean="0">
                 <a:latin typeface="Verdana" pitchFamily="34" charset="0"/>
@@ -3685,6 +3696,7 @@
             </a:r>
           </a:p>
           <a:p>
+            <a:pPr algn="just"/>
             <a:r>
               <a:rPr lang="en-US" sz="3000" dirty="0" smtClean="0">
                 <a:latin typeface="Verdana" pitchFamily="34" charset="0"/>
@@ -3705,11 +3717,13 @@
             </a:r>
           </a:p>
           <a:p>
+            <a:pPr algn="just"/>
             <a:endParaRPr lang="en-US" sz="3000" dirty="0">
               <a:latin typeface="Verdana" pitchFamily="34" charset="0"/>
             </a:endParaRPr>
           </a:p>
           <a:p>
+            <a:pPr algn="just"/>
             <a:r>
               <a:rPr lang="en-US" sz="3000" b="1" dirty="0" smtClean="0">
                 <a:latin typeface="Verdana" pitchFamily="34" charset="0"/>
@@ -3721,6 +3735,7 @@
             </a:endParaRPr>
           </a:p>
           <a:p>
+            <a:pPr algn="just"/>
             <a:r>
               <a:rPr lang="en-US" sz="3000" dirty="0" smtClean="0">
                 <a:latin typeface="Verdana" pitchFamily="34" charset="0"/>
@@ -3767,8 +3782,8 @@
         </p:blipFill>
         <p:spPr bwMode="auto">
           <a:xfrm>
-            <a:off x="26851029" y="18849544"/>
-            <a:ext cx="15705813" cy="10747012"/>
+            <a:off x="26782737" y="18600883"/>
+            <a:ext cx="15842394" cy="10812317"/>
           </a:xfrm>
           <a:prstGeom prst="rect">
             <a:avLst/>

</xml_diff>

<commit_message>
Removed transparancy background from block diagrams
</commit_message>
<xml_diff>
--- a/av3/rocketnet-hub/poster/RocketNetHub_Poster_woodruff.pptx
+++ b/av3/rocketnet-hub/poster/RocketNetHub_Poster_woodruff.pptx
@@ -3067,8 +3067,8 @@
         </p:nvSpPr>
         <p:spPr>
           <a:xfrm flipV="1">
-            <a:off x="-762000" y="-152400"/>
-            <a:ext cx="46405800" cy="4383435"/>
+            <a:off x="195942" y="-152402"/>
+            <a:ext cx="43695257" cy="4383435"/>
           </a:xfrm>
           <a:prstGeom prst="rect">
             <a:avLst/>
@@ -3105,7 +3105,7 @@
       </p:sp>
       <p:pic>
         <p:nvPicPr>
-          <p:cNvPr id="8" name="Picture 2" descr="C:\Users\HP-Elitebook\repos\avionics-cad\av3\rocketnet-hub\poster\schematic-combined.png"/>
+          <p:cNvPr id="8" name="Picture 2"/>
           <p:cNvPicPr>
             <a:picLocks noChangeAspect="1" noChangeArrowheads="1"/>
           </p:cNvPicPr>
@@ -3119,15 +3119,14 @@
               </a:ext>
             </a:extLst>
           </a:blip>
-          <a:srcRect/>
           <a:stretch>
             <a:fillRect/>
           </a:stretch>
         </p:blipFill>
         <p:spPr bwMode="auto">
           <a:xfrm>
-            <a:off x="815856" y="6526608"/>
-            <a:ext cx="46824901" cy="23315613"/>
+            <a:off x="4364782" y="5399564"/>
+            <a:ext cx="34649618" cy="25585656"/>
           </a:xfrm>
           <a:prstGeom prst="rect">
             <a:avLst/>
@@ -3283,19 +3282,7 @@
               <a:rPr lang="en-US" sz="3000" dirty="0" smtClean="0">
                 <a:latin typeface="Verdana" pitchFamily="34" charset="0"/>
               </a:rPr>
-              <a:t>atency </a:t>
-            </a:r>
-            <a:r>
-              <a:rPr lang="en-US" sz="3000" dirty="0" smtClean="0">
-                <a:latin typeface="Verdana" pitchFamily="34" charset="0"/>
-              </a:rPr>
-              <a:t>communication between all of the </a:t>
-            </a:r>
-            <a:r>
-              <a:rPr lang="en-US" sz="3000" dirty="0" smtClean="0">
-                <a:latin typeface="Verdana" pitchFamily="34" charset="0"/>
-              </a:rPr>
-              <a:t>electronic</a:t>
+              <a:t>atency communication between all of the electronic</a:t>
             </a:r>
           </a:p>
           <a:p>
@@ -3310,13 +3297,7 @@
               <a:rPr lang="en-US" sz="3000" dirty="0" smtClean="0">
                 <a:latin typeface="Verdana" pitchFamily="34" charset="0"/>
               </a:rPr>
-              <a:t>ubsystems </a:t>
-            </a:r>
-            <a:r>
-              <a:rPr lang="en-US" sz="3000" dirty="0" smtClean="0">
-                <a:latin typeface="Verdana" pitchFamily="34" charset="0"/>
-              </a:rPr>
-              <a:t>used in-flight on a single 6-layer PCB</a:t>
+              <a:t>ubsystems used in-flight on a single 6-layer PCB</a:t>
             </a:r>
           </a:p>
           <a:p>
@@ -3544,7 +3525,7 @@
         </p:nvSpPr>
         <p:spPr>
           <a:xfrm>
-            <a:off x="1247274" y="15752385"/>
+            <a:off x="1498016" y="15752385"/>
             <a:ext cx="24333784" cy="13203615"/>
           </a:xfrm>
           <a:prstGeom prst="rect">
@@ -3563,7 +3544,13 @@
               <a:rPr lang="en-US" sz="7200" b="1" dirty="0" smtClean="0">
                 <a:latin typeface="Verdana" pitchFamily="34" charset="0"/>
               </a:rPr>
-              <a:t>Subsystems Design</a:t>
+              <a:t>Subsystems </a:t>
+            </a:r>
+            <a:r>
+              <a:rPr lang="en-US" sz="7200" b="1" dirty="0" smtClean="0">
+                <a:latin typeface="Verdana" pitchFamily="34" charset="0"/>
+              </a:rPr>
+              <a:t>Design</a:t>
             </a:r>
             <a:endParaRPr lang="en-US" sz="7200" b="1" dirty="0">
               <a:latin typeface="Verdana" pitchFamily="34" charset="0"/>
@@ -3812,14 +3799,14 @@
           <p:nvPr>
             <p:extLst>
               <p:ext uri="{D42A27DB-BD31-4B8C-83A1-F6EECF244321}">
-                <p14:modId xmlns:p14="http://schemas.microsoft.com/office/powerpoint/2010/main" val="3246525833"/>
+                <p14:modId xmlns:p14="http://schemas.microsoft.com/office/powerpoint/2010/main" val="4236476623"/>
               </p:ext>
             </p:extLst>
           </p:nvPr>
         </p:nvGraphicFramePr>
         <p:xfrm>
-          <a:off x="-152399" y="3429000"/>
-          <a:ext cx="44653199" cy="1554480"/>
+          <a:off x="0" y="3429000"/>
+          <a:ext cx="44348400" cy="1554480"/>
         </p:xfrm>
         <a:graphic>
           <a:graphicData uri="http://schemas.openxmlformats.org/drawingml/2006/table">
@@ -3828,9 +3815,9 @@
                 <a:tableStyleId>{5C22544A-7EE6-4342-B048-85BDC9FD1C3A}</a:tableStyleId>
               </a:tblPr>
               <a:tblGrid>
-                <a:gridCol w="13632758"/>
-                <a:gridCol w="16136041"/>
-                <a:gridCol w="14884400"/>
+                <a:gridCol w="13539702"/>
+                <a:gridCol w="16025898"/>
+                <a:gridCol w="14782800"/>
               </a:tblGrid>
               <a:tr h="1327863">
                 <a:tc>
@@ -3987,8 +3974,8 @@
         </p:nvSpPr>
         <p:spPr>
           <a:xfrm flipH="1">
-            <a:off x="1" y="0"/>
-            <a:ext cx="391885" cy="32918400"/>
+            <a:off x="0" y="-152402"/>
+            <a:ext cx="391886" cy="33070802"/>
           </a:xfrm>
           <a:prstGeom prst="rect">
             <a:avLst/>
@@ -4079,29 +4066,28 @@
       </p:sp>
       <p:pic>
         <p:nvPicPr>
-          <p:cNvPr id="1027" name="Picture 3" descr="C:\Users\HP-Elitebook\repos\avionics-cad\av3\rocketnet-hub\block_diagrams\fullblock-higherlevel.png"/>
+          <p:cNvPr id="1027" name="Picture 3"/>
           <p:cNvPicPr>
             <a:picLocks noChangeAspect="1" noChangeArrowheads="1"/>
           </p:cNvPicPr>
           <p:nvPr/>
         </p:nvPicPr>
         <p:blipFill>
-          <a:blip r:embed="rId5" cstate="print">
+          <a:blip r:embed="rId5">
             <a:extLst>
               <a:ext uri="{28A0092B-C50C-407E-A947-70E740481C1C}">
                 <a14:useLocalDpi xmlns:a14="http://schemas.microsoft.com/office/drawing/2010/main" val="0"/>
               </a:ext>
             </a:extLst>
           </a:blip>
-          <a:srcRect/>
           <a:stretch>
             <a:fillRect/>
           </a:stretch>
         </p:blipFill>
         <p:spPr bwMode="auto">
           <a:xfrm>
-            <a:off x="1219200" y="5181600"/>
-            <a:ext cx="15617396" cy="9829800"/>
+            <a:off x="1375168" y="5181600"/>
+            <a:ext cx="15305460" cy="9829800"/>
           </a:xfrm>
           <a:prstGeom prst="rect">
             <a:avLst/>
@@ -4120,29 +4106,28 @@
       </p:pic>
       <p:pic>
         <p:nvPicPr>
-          <p:cNvPr id="1028" name="Picture 4" descr="C:\Users\HP-Elitebook\repos\avionics-cad\av3\rocketnet-hub\block_diagrams\blockdiagram.png"/>
+          <p:cNvPr id="1028" name="Picture 4"/>
           <p:cNvPicPr>
             <a:picLocks noChangeAspect="1" noChangeArrowheads="1"/>
           </p:cNvPicPr>
           <p:nvPr/>
         </p:nvPicPr>
         <p:blipFill>
-          <a:blip r:embed="rId6" cstate="print">
+          <a:blip r:embed="rId6">
             <a:extLst>
               <a:ext uri="{28A0092B-C50C-407E-A947-70E740481C1C}">
                 <a14:useLocalDpi xmlns:a14="http://schemas.microsoft.com/office/drawing/2010/main" val="0"/>
               </a:ext>
             </a:extLst>
           </a:blip>
-          <a:srcRect/>
           <a:stretch>
             <a:fillRect/>
           </a:stretch>
         </p:blipFill>
         <p:spPr bwMode="auto">
           <a:xfrm>
-            <a:off x="28170214" y="8425323"/>
-            <a:ext cx="13067441" cy="9710277"/>
+            <a:off x="28177528" y="8425323"/>
+            <a:ext cx="13052812" cy="9710277"/>
           </a:xfrm>
           <a:prstGeom prst="rect">
             <a:avLst/>

</xml_diff>

<commit_message>
Modified team member name order on poster
</commit_message>
<xml_diff>
--- a/av3/rocketnet-hub/poster/RocketNetHub_Poster_woodruff.pptx
+++ b/av3/rocketnet-hub/poster/RocketNetHub_Poster_woodruff.pptx
@@ -3236,8 +3236,8 @@
         </p:nvSpPr>
         <p:spPr>
           <a:xfrm>
-            <a:off x="17171744" y="4876800"/>
-            <a:ext cx="24065912" cy="4875877"/>
+            <a:off x="17171744" y="5047982"/>
+            <a:ext cx="24065912" cy="3029218"/>
           </a:xfrm>
           <a:prstGeom prst="rect">
             <a:avLst/>
@@ -3267,47 +3267,29 @@
               <a:rPr lang="en-US" sz="3000" dirty="0" smtClean="0">
                 <a:latin typeface="Verdana" pitchFamily="34" charset="0"/>
               </a:rPr>
-              <a:t>The capstone sponsor, Portland State Aerospace Society (PSAS), designs, builds, and launches high-power rockets. Their 2013 Capstone project is a power management and communications solution for use in both their current and next generation launch vehicles.  To accommodate the size and weight restrictions imposed by the physical characteristics of the current launch vehicle, the decision was made to pursue a highly integrated solution which would provide for all the power management functions as well as provide low</a:t>
-            </a:r>
-          </a:p>
-          <a:p>
-            <a:pPr algn="just"/>
-            <a:r>
-              <a:rPr lang="en-US" sz="3000" dirty="0">
-                <a:latin typeface="Verdana" pitchFamily="34" charset="0"/>
-              </a:rPr>
-              <a:t>l</a:t>
+              <a:t>The capstone sponsor, Portland State Aerospace Society (PSAS), designs, builds, and launches high-power rockets. Their </a:t>
             </a:r>
             <a:r>
               <a:rPr lang="en-US" sz="3000" dirty="0" smtClean="0">
                 <a:latin typeface="Verdana" pitchFamily="34" charset="0"/>
               </a:rPr>
-              <a:t>atency communication between all of the electronic</a:t>
-            </a:r>
-          </a:p>
-          <a:p>
-            <a:pPr algn="just"/>
-            <a:r>
-              <a:rPr lang="en-US" sz="3000" dirty="0">
-                <a:latin typeface="Verdana" pitchFamily="34" charset="0"/>
-              </a:rPr>
-              <a:t>s</a:t>
+              <a:t>2012-2013 </a:t>
             </a:r>
             <a:r>
               <a:rPr lang="en-US" sz="3000" dirty="0" smtClean="0">
                 <a:latin typeface="Verdana" pitchFamily="34" charset="0"/>
               </a:rPr>
-              <a:t>ubsystems used in-flight on a single 6-layer PCB</a:t>
-            </a:r>
-          </a:p>
-          <a:p>
-            <a:pPr algn="just"/>
+              <a:t>Capstone project is a power management and communications solution for use in both their current and next generation launch vehicles.  To accommodate the size and weight restrictions imposed by the physical characteristics of the current launch vehicle, the decision was made to pursue a highly integrated solution which would provide for all the </a:t>
+            </a:r>
             <a:r>
               <a:rPr lang="en-US" sz="3000" dirty="0" smtClean="0">
                 <a:latin typeface="Verdana" pitchFamily="34" charset="0"/>
               </a:rPr>
-              <a:t>with components placed on both sides.</a:t>
-            </a:r>
+              <a:t>power</a:t>
+            </a:r>
+            <a:endParaRPr lang="en-US" sz="3000" dirty="0" smtClean="0">
+              <a:latin typeface="Verdana" pitchFamily="34" charset="0"/>
+            </a:endParaRPr>
           </a:p>
         </p:txBody>
       </p:sp>
@@ -3369,9 +3351,18 @@
                 </a:solidFill>
                 <a:latin typeface="Garamond" pitchFamily="18" charset="0"/>
               </a:rPr>
-              <a:t> Hub | Capstone 2012-2013</a:t>
-            </a:r>
-            <a:endParaRPr lang="en-US" sz="15800" b="1" cap="small" dirty="0">
+              <a:t> Hub | </a:t>
+            </a:r>
+            <a:r>
+              <a:rPr lang="en-US" sz="9600" b="1" cap="small" dirty="0" smtClean="0">
+                <a:solidFill>
+                  <a:srgbClr val="6A7F10"/>
+                </a:solidFill>
+                <a:latin typeface="Garamond" pitchFamily="18" charset="0"/>
+              </a:rPr>
+              <a:t>Capstone 2012-2013</a:t>
+            </a:r>
+            <a:endParaRPr lang="en-US" sz="13200" b="1" cap="small" dirty="0">
               <a:solidFill>
                 <a:srgbClr val="6A7F10"/>
               </a:solidFill>
@@ -3525,7 +3516,7 @@
         </p:nvSpPr>
         <p:spPr>
           <a:xfrm>
-            <a:off x="1498016" y="15752385"/>
+            <a:off x="1498016" y="15621000"/>
             <a:ext cx="24333784" cy="13203615"/>
           </a:xfrm>
           <a:prstGeom prst="rect">
@@ -3544,13 +3535,7 @@
               <a:rPr lang="en-US" sz="7200" b="1" dirty="0" smtClean="0">
                 <a:latin typeface="Verdana" pitchFamily="34" charset="0"/>
               </a:rPr>
-              <a:t>Subsystems </a:t>
-            </a:r>
-            <a:r>
-              <a:rPr lang="en-US" sz="7200" b="1" dirty="0" smtClean="0">
-                <a:latin typeface="Verdana" pitchFamily="34" charset="0"/>
-              </a:rPr>
-              <a:t>Design</a:t>
+              <a:t>Subsystems Design</a:t>
             </a:r>
             <a:endParaRPr lang="en-US" sz="7200" b="1" dirty="0">
               <a:latin typeface="Verdana" pitchFamily="34" charset="0"/>
@@ -3799,14 +3784,14 @@
           <p:nvPr>
             <p:extLst>
               <p:ext uri="{D42A27DB-BD31-4B8C-83A1-F6EECF244321}">
-                <p14:modId xmlns:p14="http://schemas.microsoft.com/office/powerpoint/2010/main" val="4236476623"/>
+                <p14:modId xmlns:p14="http://schemas.microsoft.com/office/powerpoint/2010/main" val="4049037554"/>
               </p:ext>
             </p:extLst>
           </p:nvPr>
         </p:nvGraphicFramePr>
         <p:xfrm>
           <a:off x="0" y="3429000"/>
-          <a:ext cx="44348400" cy="1554480"/>
+          <a:ext cx="44196000" cy="1554480"/>
         </p:xfrm>
         <a:graphic>
           <a:graphicData uri="http://schemas.openxmlformats.org/drawingml/2006/table">
@@ -3815,9 +3800,9 @@
                 <a:tableStyleId>{5C22544A-7EE6-4342-B048-85BDC9FD1C3A}</a:tableStyleId>
               </a:tblPr>
               <a:tblGrid>
-                <a:gridCol w="13539702"/>
-                <a:gridCol w="16025898"/>
-                <a:gridCol w="14782800"/>
+                <a:gridCol w="12681670"/>
+                <a:gridCol w="17617650"/>
+                <a:gridCol w="13896680"/>
               </a:tblGrid>
               <a:tr h="1327863">
                 <a:tc>
@@ -3873,7 +3858,7 @@
                             <a:sysClr val="windowText" lastClr="000000"/>
                           </a:solidFill>
                         </a:rPr>
-                        <a:t>Members:</a:t>
+                        <a:t>Team Members:</a:t>
                       </a:r>
                       <a:r>
                         <a:rPr lang="en-US" sz="4800" baseline="0" dirty="0" smtClean="0">
@@ -3889,7 +3874,15 @@
                             <a:sysClr val="windowText" lastClr="000000"/>
                           </a:solidFill>
                         </a:rPr>
-                        <a:t>Jackson Pugh-Michael Woodruff-JJ Hartley </a:t>
+                        <a:t>JJ Hartley,</a:t>
+                      </a:r>
+                      <a:r>
+                        <a:rPr lang="en-US" sz="4800" baseline="0" dirty="0" smtClean="0">
+                          <a:solidFill>
+                            <a:sysClr val="windowText" lastClr="000000"/>
+                          </a:solidFill>
+                        </a:rPr>
+                        <a:t> Jackson Pugh, and Michael Woodruff</a:t>
                       </a:r>
                       <a:endParaRPr lang="en-US" sz="4800" dirty="0">
                         <a:solidFill>
@@ -4144,6 +4137,68 @@
           </a:extLst>
         </p:spPr>
       </p:pic>
+      <p:sp>
+        <p:nvSpPr>
+          <p:cNvPr id="2" name="TextBox 1"/>
+          <p:cNvSpPr txBox="1"/>
+          <p:nvPr/>
+        </p:nvSpPr>
+        <p:spPr>
+          <a:xfrm>
+            <a:off x="17145000" y="8038743"/>
+            <a:ext cx="10433165" cy="2400657"/>
+          </a:xfrm>
+          <a:prstGeom prst="rect">
+            <a:avLst/>
+          </a:prstGeom>
+          <a:noFill/>
+        </p:spPr>
+        <p:txBody>
+          <a:bodyPr wrap="square" rtlCol="0">
+            <a:spAutoFit/>
+          </a:bodyPr>
+          <a:lstStyle/>
+          <a:p>
+            <a:pPr algn="just"/>
+            <a:r>
+              <a:rPr lang="en-US" sz="3000" dirty="0">
+                <a:latin typeface="Verdana" pitchFamily="34" charset="0"/>
+              </a:rPr>
+              <a:t>management functions as well as provide low</a:t>
+            </a:r>
+          </a:p>
+          <a:p>
+            <a:pPr algn="just"/>
+            <a:r>
+              <a:rPr lang="en-US" sz="3000" dirty="0">
+                <a:latin typeface="Verdana" pitchFamily="34" charset="0"/>
+              </a:rPr>
+              <a:t>latency communication between all of the electronic</a:t>
+            </a:r>
+          </a:p>
+          <a:p>
+            <a:pPr algn="just"/>
+            <a:r>
+              <a:rPr lang="en-US" sz="3000" dirty="0">
+                <a:latin typeface="Verdana" pitchFamily="34" charset="0"/>
+              </a:rPr>
+              <a:t>subsystems used in-flight on a single 6-layer PCB</a:t>
+            </a:r>
+          </a:p>
+          <a:p>
+            <a:pPr algn="just"/>
+            <a:r>
+              <a:rPr lang="en-US" sz="3000" dirty="0">
+                <a:latin typeface="Verdana" pitchFamily="34" charset="0"/>
+              </a:rPr>
+              <a:t>with components placed on both sides.</a:t>
+            </a:r>
+          </a:p>
+          <a:p>
+            <a:endParaRPr lang="en-US" sz="3000" dirty="0"/>
+          </a:p>
+        </p:txBody>
+      </p:sp>
     </p:spTree>
   </p:cSld>
   <p:clrMapOvr>

</xml_diff>